<commit_message>
bugs at AIM, everything OK.
</commit_message>
<xml_diff>
--- a/演示文稿1.pptx
+++ b/演示文稿1.pptx
@@ -8091,6 +8091,262 @@
           </p:spPr>
         </p:pic>
       </p:grpSp>
+      <p:grpSp>
+        <p:nvGrpSpPr>
+          <p:cNvPr id="30" name="组合 29">
+            <a:extLst>
+              <a:ext uri="{FF2B5EF4-FFF2-40B4-BE49-F238E27FC236}">
+                <a16:creationId xmlns:a16="http://schemas.microsoft.com/office/drawing/2014/main" id="{3FFCF89A-0BD3-45B1-A603-FE69E1380EAB}"/>
+              </a:ext>
+            </a:extLst>
+          </p:cNvPr>
+          <p:cNvGrpSpPr/>
+          <p:nvPr/>
+        </p:nvGrpSpPr>
+        <p:grpSpPr>
+          <a:xfrm>
+            <a:off x="9251919" y="666488"/>
+            <a:ext cx="365760" cy="365760"/>
+            <a:chOff x="9098260" y="3107094"/>
+            <a:chExt cx="2057928" cy="2019899"/>
+          </a:xfrm>
+        </p:grpSpPr>
+        <p:pic>
+          <p:nvPicPr>
+            <p:cNvPr id="31" name="图片 30">
+              <a:extLst>
+                <a:ext uri="{FF2B5EF4-FFF2-40B4-BE49-F238E27FC236}">
+                  <a16:creationId xmlns:a16="http://schemas.microsoft.com/office/drawing/2014/main" id="{8DC42E57-907A-43A9-8E61-3757A1DB532F}"/>
+                </a:ext>
+              </a:extLst>
+            </p:cNvPr>
+            <p:cNvPicPr>
+              <a:picLocks noChangeAspect="1"/>
+            </p:cNvPicPr>
+            <p:nvPr/>
+          </p:nvPicPr>
+          <p:blipFill rotWithShape="1">
+            <a:blip r:embed="rId9">
+              <a:extLst>
+                <a:ext uri="{28A0092B-C50C-407E-A947-70E740481C1C}">
+                  <a14:useLocalDpi xmlns:a14="http://schemas.microsoft.com/office/drawing/2010/main" val="0"/>
+                </a:ext>
+              </a:extLst>
+            </a:blip>
+            <a:srcRect l="16407" t="15644" r="18123" b="20095"/>
+            <a:stretch/>
+          </p:blipFill>
+          <p:spPr>
+            <a:xfrm>
+              <a:off x="9098260" y="3107094"/>
+              <a:ext cx="2057928" cy="2019899"/>
+            </a:xfrm>
+            <a:prstGeom prst="rect">
+              <a:avLst/>
+            </a:prstGeom>
+          </p:spPr>
+        </p:pic>
+        <p:pic>
+          <p:nvPicPr>
+            <p:cNvPr id="32" name="图片 31">
+              <a:extLst>
+                <a:ext uri="{FF2B5EF4-FFF2-40B4-BE49-F238E27FC236}">
+                  <a16:creationId xmlns:a16="http://schemas.microsoft.com/office/drawing/2014/main" id="{9D54CC12-9EE9-499D-8186-FDAE97FB3572}"/>
+                </a:ext>
+              </a:extLst>
+            </p:cNvPr>
+            <p:cNvPicPr>
+              <a:picLocks noChangeAspect="1"/>
+            </p:cNvPicPr>
+            <p:nvPr/>
+          </p:nvPicPr>
+          <p:blipFill>
+            <a:blip r:embed="rId10">
+              <a:extLst>
+                <a:ext uri="{28A0092B-C50C-407E-A947-70E740481C1C}">
+                  <a14:useLocalDpi xmlns:a14="http://schemas.microsoft.com/office/drawing/2010/main" val="0"/>
+                </a:ext>
+              </a:extLst>
+            </a:blip>
+            <a:stretch>
+              <a:fillRect/>
+            </a:stretch>
+          </p:blipFill>
+          <p:spPr>
+            <a:xfrm>
+              <a:off x="9558608" y="3415644"/>
+              <a:ext cx="1286524" cy="1286524"/>
+            </a:xfrm>
+            <a:prstGeom prst="rect">
+              <a:avLst/>
+            </a:prstGeom>
+          </p:spPr>
+        </p:pic>
+      </p:grpSp>
+      <p:grpSp>
+        <p:nvGrpSpPr>
+          <p:cNvPr id="35" name="组合 34">
+            <a:extLst>
+              <a:ext uri="{FF2B5EF4-FFF2-40B4-BE49-F238E27FC236}">
+                <a16:creationId xmlns:a16="http://schemas.microsoft.com/office/drawing/2014/main" id="{55426128-2EB6-4008-9FCF-C2A50665E932}"/>
+              </a:ext>
+            </a:extLst>
+          </p:cNvPr>
+          <p:cNvGrpSpPr/>
+          <p:nvPr/>
+        </p:nvGrpSpPr>
+        <p:grpSpPr>
+          <a:xfrm>
+            <a:off x="10510003" y="1545965"/>
+            <a:ext cx="365760" cy="365760"/>
+            <a:chOff x="9020235" y="1214072"/>
+            <a:chExt cx="2057928" cy="2019899"/>
+          </a:xfrm>
+        </p:grpSpPr>
+        <p:pic>
+          <p:nvPicPr>
+            <p:cNvPr id="33" name="图片 32">
+              <a:extLst>
+                <a:ext uri="{FF2B5EF4-FFF2-40B4-BE49-F238E27FC236}">
+                  <a16:creationId xmlns:a16="http://schemas.microsoft.com/office/drawing/2014/main" id="{F46095E6-ED8D-4046-901E-C14DD98C65D5}"/>
+                </a:ext>
+              </a:extLst>
+            </p:cNvPr>
+            <p:cNvPicPr>
+              <a:picLocks noChangeAspect="1"/>
+            </p:cNvPicPr>
+            <p:nvPr/>
+          </p:nvPicPr>
+          <p:blipFill>
+            <a:blip r:embed="rId11">
+              <a:extLst>
+                <a:ext uri="{28A0092B-C50C-407E-A947-70E740481C1C}">
+                  <a14:useLocalDpi xmlns:a14="http://schemas.microsoft.com/office/drawing/2010/main" val="0"/>
+                </a:ext>
+              </a:extLst>
+            </a:blip>
+            <a:stretch>
+              <a:fillRect/>
+            </a:stretch>
+          </p:blipFill>
+          <p:spPr>
+            <a:xfrm rot="20490797">
+              <a:off x="9552916" y="1573665"/>
+              <a:ext cx="1214656" cy="1214656"/>
+            </a:xfrm>
+            <a:prstGeom prst="rect">
+              <a:avLst/>
+            </a:prstGeom>
+          </p:spPr>
+        </p:pic>
+        <p:pic>
+          <p:nvPicPr>
+            <p:cNvPr id="34" name="图片 33">
+              <a:extLst>
+                <a:ext uri="{FF2B5EF4-FFF2-40B4-BE49-F238E27FC236}">
+                  <a16:creationId xmlns:a16="http://schemas.microsoft.com/office/drawing/2014/main" id="{1E65E612-88B2-46F9-B9B6-41860E6657AF}"/>
+                </a:ext>
+              </a:extLst>
+            </p:cNvPr>
+            <p:cNvPicPr>
+              <a:picLocks noChangeAspect="1"/>
+            </p:cNvPicPr>
+            <p:nvPr/>
+          </p:nvPicPr>
+          <p:blipFill rotWithShape="1">
+            <a:blip r:embed="rId9">
+              <a:extLst>
+                <a:ext uri="{28A0092B-C50C-407E-A947-70E740481C1C}">
+                  <a14:useLocalDpi xmlns:a14="http://schemas.microsoft.com/office/drawing/2010/main" val="0"/>
+                </a:ext>
+              </a:extLst>
+            </a:blip>
+            <a:srcRect l="16407" t="15644" r="18123" b="20095"/>
+            <a:stretch/>
+          </p:blipFill>
+          <p:spPr>
+            <a:xfrm>
+              <a:off x="9020235" y="1214072"/>
+              <a:ext cx="2057928" cy="2019899"/>
+            </a:xfrm>
+            <a:prstGeom prst="rect">
+              <a:avLst/>
+            </a:prstGeom>
+          </p:spPr>
+        </p:pic>
+      </p:grpSp>
+      <p:pic>
+        <p:nvPicPr>
+          <p:cNvPr id="37" name="图片 36">
+            <a:extLst>
+              <a:ext uri="{FF2B5EF4-FFF2-40B4-BE49-F238E27FC236}">
+                <a16:creationId xmlns:a16="http://schemas.microsoft.com/office/drawing/2014/main" id="{BC102077-0D47-4521-94A3-3B9812F9B722}"/>
+              </a:ext>
+            </a:extLst>
+          </p:cNvPr>
+          <p:cNvPicPr>
+            <a:picLocks noChangeAspect="1"/>
+          </p:cNvPicPr>
+          <p:nvPr/>
+        </p:nvPicPr>
+        <p:blipFill>
+          <a:blip r:embed="rId12">
+            <a:extLst>
+              <a:ext uri="{28A0092B-C50C-407E-A947-70E740481C1C}">
+                <a14:useLocalDpi xmlns:a14="http://schemas.microsoft.com/office/drawing/2010/main" val="0"/>
+              </a:ext>
+            </a:extLst>
+          </a:blip>
+          <a:stretch>
+            <a:fillRect/>
+          </a:stretch>
+        </p:blipFill>
+        <p:spPr>
+          <a:xfrm>
+            <a:off x="7001350" y="4522607"/>
+            <a:ext cx="965856" cy="965856"/>
+          </a:xfrm>
+          <a:prstGeom prst="rect">
+            <a:avLst/>
+          </a:prstGeom>
+        </p:spPr>
+      </p:pic>
+      <p:pic>
+        <p:nvPicPr>
+          <p:cNvPr id="38" name="图片 37">
+            <a:extLst>
+              <a:ext uri="{FF2B5EF4-FFF2-40B4-BE49-F238E27FC236}">
+                <a16:creationId xmlns:a16="http://schemas.microsoft.com/office/drawing/2014/main" id="{3DF166EC-A63D-4E51-A085-8B4A28B771DE}"/>
+              </a:ext>
+            </a:extLst>
+          </p:cNvPr>
+          <p:cNvPicPr>
+            <a:picLocks noChangeAspect="1"/>
+          </p:cNvPicPr>
+          <p:nvPr/>
+        </p:nvPicPr>
+        <p:blipFill>
+          <a:blip r:embed="rId12">
+            <a:extLst>
+              <a:ext uri="{28A0092B-C50C-407E-A947-70E740481C1C}">
+                <a14:useLocalDpi xmlns:a14="http://schemas.microsoft.com/office/drawing/2010/main" val="0"/>
+              </a:ext>
+            </a:extLst>
+          </a:blip>
+          <a:stretch>
+            <a:fillRect/>
+          </a:stretch>
+        </p:blipFill>
+        <p:spPr>
+          <a:xfrm rot="1162933">
+            <a:off x="7190729" y="4808296"/>
+            <a:ext cx="965856" cy="965856"/>
+          </a:xfrm>
+          <a:prstGeom prst="rect">
+            <a:avLst/>
+          </a:prstGeom>
+        </p:spPr>
+      </p:pic>
     </p:spTree>
     <p:extLst>
       <p:ext uri="{BB962C8B-B14F-4D97-AF65-F5344CB8AC3E}">

</xml_diff>